<commit_message>
add extra data summaries
</commit_message>
<xml_diff>
--- a/PCBA allocation procedure and logic - Nov 12.pptx
+++ b/PCBA allocation procedure and logic - Nov 12.pptx
@@ -5,17 +5,18 @@
     <p:sldMasterId id="2147483662" r:id="rId1"/>
   </p:sldMasterIdLst>
   <p:notesMasterIdLst>
-    <p:notesMasterId r:id="rId10"/>
+    <p:notesMasterId r:id="rId11"/>
   </p:notesMasterIdLst>
   <p:sldIdLst>
     <p:sldId id="267" r:id="rId2"/>
     <p:sldId id="291" r:id="rId3"/>
     <p:sldId id="290" r:id="rId4"/>
     <p:sldId id="285" r:id="rId5"/>
-    <p:sldId id="281" r:id="rId6"/>
-    <p:sldId id="286" r:id="rId7"/>
-    <p:sldId id="288" r:id="rId8"/>
-    <p:sldId id="287" r:id="rId9"/>
+    <p:sldId id="292" r:id="rId6"/>
+    <p:sldId id="281" r:id="rId7"/>
+    <p:sldId id="286" r:id="rId8"/>
+    <p:sldId id="288" r:id="rId9"/>
+    <p:sldId id="287" r:id="rId10"/>
   </p:sldIdLst>
   <p:sldSz cx="12192000" cy="6858000"/>
   <p:notesSz cx="6858000" cy="9144000"/>
@@ -234,7 +235,7 @@
           <a:p>
             <a:fld id="{055D18FD-D4CC-4163-B221-261AEA246121}" type="datetimeFigureOut">
               <a:rPr lang="en-US" smtClean="0"/>
-              <a:t>11/12/20</a:t>
+              <a:t>11/16/20</a:t>
             </a:fld>
             <a:endParaRPr lang="en-US"/>
           </a:p>
@@ -569,14 +570,14 @@
           </a:ln>
           <a:extLst>
             <a:ext uri="{909E8E84-426E-40dd-AFC4-6F175D3DCCD1}">
-              <a14:hiddenFill xmlns:a14="http://schemas.microsoft.com/office/drawing/2010/main" xmlns="">
+              <a14:hiddenFill xmlns="" xmlns:a14="http://schemas.microsoft.com/office/drawing/2010/main">
                 <a:solidFill>
                   <a:srgbClr val="FFFFFF"/>
                 </a:solidFill>
               </a14:hiddenFill>
             </a:ext>
             <a:ext uri="{91240B29-F687-4f45-9708-019B960494DF}">
-              <a14:hiddenLine xmlns:a14="http://schemas.microsoft.com/office/drawing/2010/main" xmlns="" w="9525">
+              <a14:hiddenLine xmlns="" xmlns:a14="http://schemas.microsoft.com/office/drawing/2010/main" w="9525">
                 <a:solidFill>
                   <a:srgbClr val="000000"/>
                 </a:solidFill>
@@ -1361,14 +1362,14 @@
           </a:ln>
           <a:extLst>
             <a:ext uri="{909E8E84-426E-40dd-AFC4-6F175D3DCCD1}">
-              <a14:hiddenFill xmlns:a14="http://schemas.microsoft.com/office/drawing/2010/main" xmlns="">
+              <a14:hiddenFill xmlns="" xmlns:a14="http://schemas.microsoft.com/office/drawing/2010/main">
                 <a:solidFill>
                   <a:srgbClr val="FFFFFF"/>
                 </a:solidFill>
               </a14:hiddenFill>
             </a:ext>
             <a:ext uri="{91240B29-F687-4f45-9708-019B960494DF}">
-              <a14:hiddenLine xmlns:a14="http://schemas.microsoft.com/office/drawing/2010/main" xmlns="" w="9525">
+              <a14:hiddenLine xmlns="" xmlns:a14="http://schemas.microsoft.com/office/drawing/2010/main" w="9525">
                 <a:solidFill>
                   <a:srgbClr val="000000"/>
                 </a:solidFill>
@@ -1757,14 +1758,14 @@
           </a:ln>
           <a:extLst>
             <a:ext uri="{909E8E84-426E-40dd-AFC4-6F175D3DCCD1}">
-              <a14:hiddenFill xmlns:a14="http://schemas.microsoft.com/office/drawing/2010/main" xmlns="">
+              <a14:hiddenFill xmlns="" xmlns:a14="http://schemas.microsoft.com/office/drawing/2010/main">
                 <a:solidFill>
                   <a:srgbClr val="FFFFFF"/>
                 </a:solidFill>
               </a14:hiddenFill>
             </a:ext>
             <a:ext uri="{91240B29-F687-4f45-9708-019B960494DF}">
-              <a14:hiddenLine xmlns:a14="http://schemas.microsoft.com/office/drawing/2010/main" xmlns="" w="9525">
+              <a14:hiddenLine xmlns="" xmlns:a14="http://schemas.microsoft.com/office/drawing/2010/main" w="9525">
                 <a:solidFill>
                   <a:srgbClr val="000000"/>
                 </a:solidFill>
@@ -3406,14 +3407,14 @@
           </a:ln>
           <a:extLst>
             <a:ext uri="{909E8E84-426E-40dd-AFC4-6F175D3DCCD1}">
-              <a14:hiddenFill xmlns:a14="http://schemas.microsoft.com/office/drawing/2010/main" xmlns="">
+              <a14:hiddenFill xmlns="" xmlns:a14="http://schemas.microsoft.com/office/drawing/2010/main">
                 <a:solidFill>
                   <a:srgbClr val="FFFFFF"/>
                 </a:solidFill>
               </a14:hiddenFill>
             </a:ext>
             <a:ext uri="{91240B29-F687-4f45-9708-019B960494DF}">
-              <a14:hiddenLine xmlns:a14="http://schemas.microsoft.com/office/drawing/2010/main" xmlns="" w="9525">
+              <a14:hiddenLine xmlns="" xmlns:a14="http://schemas.microsoft.com/office/drawing/2010/main" w="9525">
                 <a:solidFill>
                   <a:srgbClr val="000000"/>
                 </a:solidFill>
@@ -3502,14 +3503,14 @@
           </a:ln>
           <a:extLst>
             <a:ext uri="{909E8E84-426E-40dd-AFC4-6F175D3DCCD1}">
-              <a14:hiddenFill xmlns:a14="http://schemas.microsoft.com/office/drawing/2010/main" xmlns="">
+              <a14:hiddenFill xmlns="" xmlns:a14="http://schemas.microsoft.com/office/drawing/2010/main">
                 <a:solidFill>
                   <a:srgbClr val="FFFFFF"/>
                 </a:solidFill>
               </a14:hiddenFill>
             </a:ext>
             <a:ext uri="{91240B29-F687-4f45-9708-019B960494DF}">
-              <a14:hiddenLine xmlns:a14="http://schemas.microsoft.com/office/drawing/2010/main" xmlns="" w="9525">
+              <a14:hiddenLine xmlns="" xmlns:a14="http://schemas.microsoft.com/office/drawing/2010/main" w="9525">
                 <a:solidFill>
                   <a:srgbClr val="000000"/>
                 </a:solidFill>
@@ -4037,14 +4038,14 @@
           </a:ln>
           <a:extLst>
             <a:ext uri="{909E8E84-426E-40dd-AFC4-6F175D3DCCD1}">
-              <a14:hiddenFill xmlns:a14="http://schemas.microsoft.com/office/drawing/2010/main" xmlns="">
+              <a14:hiddenFill xmlns="" xmlns:a14="http://schemas.microsoft.com/office/drawing/2010/main">
                 <a:solidFill>
                   <a:srgbClr val="FFFFFF"/>
                 </a:solidFill>
               </a14:hiddenFill>
             </a:ext>
             <a:ext uri="{91240B29-F687-4f45-9708-019B960494DF}">
-              <a14:hiddenLine xmlns:a14="http://schemas.microsoft.com/office/drawing/2010/main" xmlns="" w="9525">
+              <a14:hiddenLine xmlns="" xmlns:a14="http://schemas.microsoft.com/office/drawing/2010/main" w="9525">
                 <a:solidFill>
                   <a:srgbClr val="000000"/>
                 </a:solidFill>
@@ -4513,14 +4514,14 @@
           </a:ln>
           <a:extLst>
             <a:ext uri="{909E8E84-426E-40dd-AFC4-6F175D3DCCD1}">
-              <a14:hiddenFill xmlns:a14="http://schemas.microsoft.com/office/drawing/2010/main" xmlns="">
+              <a14:hiddenFill xmlns="" xmlns:a14="http://schemas.microsoft.com/office/drawing/2010/main">
                 <a:solidFill>
                   <a:srgbClr val="FFFFFF"/>
                 </a:solidFill>
               </a14:hiddenFill>
             </a:ext>
             <a:ext uri="{91240B29-F687-4f45-9708-019B960494DF}">
-              <a14:hiddenLine xmlns:a14="http://schemas.microsoft.com/office/drawing/2010/main" xmlns="" w="9525">
+              <a14:hiddenLine xmlns="" xmlns:a14="http://schemas.microsoft.com/office/drawing/2010/main" w="9525">
                 <a:solidFill>
                   <a:srgbClr val="000000"/>
                 </a:solidFill>
@@ -4734,14 +4735,14 @@
           </a:ln>
           <a:extLst>
             <a:ext uri="{909E8E84-426E-40dd-AFC4-6F175D3DCCD1}">
-              <a14:hiddenFill xmlns:a14="http://schemas.microsoft.com/office/drawing/2010/main" xmlns="">
+              <a14:hiddenFill xmlns="" xmlns:a14="http://schemas.microsoft.com/office/drawing/2010/main">
                 <a:solidFill>
                   <a:srgbClr val="FFFFFF"/>
                 </a:solidFill>
               </a14:hiddenFill>
             </a:ext>
             <a:ext uri="{91240B29-F687-4f45-9708-019B960494DF}">
-              <a14:hiddenLine xmlns:a14="http://schemas.microsoft.com/office/drawing/2010/main" xmlns="" w="9525">
+              <a14:hiddenLine xmlns="" xmlns:a14="http://schemas.microsoft.com/office/drawing/2010/main" w="9525">
                 <a:solidFill>
                   <a:srgbClr val="000000"/>
                 </a:solidFill>
@@ -4955,14 +4956,14 @@
           </a:ln>
           <a:extLst>
             <a:ext uri="{909E8E84-426E-40dd-AFC4-6F175D3DCCD1}">
-              <a14:hiddenFill xmlns:a14="http://schemas.microsoft.com/office/drawing/2010/main" xmlns="">
+              <a14:hiddenFill xmlns="" xmlns:a14="http://schemas.microsoft.com/office/drawing/2010/main">
                 <a:solidFill>
                   <a:srgbClr val="FFFFFF"/>
                 </a:solidFill>
               </a14:hiddenFill>
             </a:ext>
             <a:ext uri="{91240B29-F687-4f45-9708-019B960494DF}">
-              <a14:hiddenLine xmlns:a14="http://schemas.microsoft.com/office/drawing/2010/main" xmlns="" w="9525">
+              <a14:hiddenLine xmlns="" xmlns:a14="http://schemas.microsoft.com/office/drawing/2010/main" w="9525">
                 <a:solidFill>
                   <a:srgbClr val="000000"/>
                 </a:solidFill>
@@ -5624,7 +5625,7 @@
           </a:ln>
           <a:extLst>
             <a:ext uri="{91240B29-F687-4f45-9708-019B960494DF}">
-              <a14:hiddenLine xmlns:a14="http://schemas.microsoft.com/office/drawing/2010/main" xmlns="" w="25400" algn="ctr">
+              <a14:hiddenLine xmlns="" xmlns:a14="http://schemas.microsoft.com/office/drawing/2010/main" w="25400" algn="ctr">
                 <a:solidFill>
                   <a:srgbClr val="000000"/>
                 </a:solidFill>
@@ -5780,7 +5781,7 @@
           </a:ln>
           <a:extLst>
             <a:ext uri="{91240B29-F687-4f45-9708-019B960494DF}">
-              <a14:hiddenLine xmlns:a14="http://schemas.microsoft.com/office/drawing/2010/main" xmlns="" w="25400" algn="ctr">
+              <a14:hiddenLine xmlns="" xmlns:a14="http://schemas.microsoft.com/office/drawing/2010/main" w="25400" algn="ctr">
                 <a:solidFill>
                   <a:srgbClr val="000000"/>
                 </a:solidFill>
@@ -5936,7 +5937,7 @@
           </a:ln>
           <a:extLst>
             <a:ext uri="{91240B29-F687-4f45-9708-019B960494DF}">
-              <a14:hiddenLine xmlns:a14="http://schemas.microsoft.com/office/drawing/2010/main" xmlns="" w="25400" algn="ctr">
+              <a14:hiddenLine xmlns="" xmlns:a14="http://schemas.microsoft.com/office/drawing/2010/main" w="25400" algn="ctr">
                 <a:solidFill>
                   <a:srgbClr val="000000"/>
                 </a:solidFill>
@@ -6090,14 +6091,14 @@
           </a:ln>
           <a:extLst>
             <a:ext uri="{909E8E84-426E-40dd-AFC4-6F175D3DCCD1}">
-              <a14:hiddenFill xmlns:a14="http://schemas.microsoft.com/office/drawing/2010/main" xmlns="">
+              <a14:hiddenFill xmlns="" xmlns:a14="http://schemas.microsoft.com/office/drawing/2010/main">
                 <a:solidFill>
                   <a:srgbClr val="FFFFFF"/>
                 </a:solidFill>
               </a14:hiddenFill>
             </a:ext>
             <a:ext uri="{91240B29-F687-4f45-9708-019B960494DF}">
-              <a14:hiddenLine xmlns:a14="http://schemas.microsoft.com/office/drawing/2010/main" xmlns="" w="9525">
+              <a14:hiddenLine xmlns="" xmlns:a14="http://schemas.microsoft.com/office/drawing/2010/main" w="9525">
                 <a:solidFill>
                   <a:srgbClr val="000000"/>
                 </a:solidFill>
@@ -12962,14 +12963,14 @@
           <a:noFill/>
           <a:extLst>
             <a:ext uri="{909E8E84-426E-40dd-AFC4-6F175D3DCCD1}">
-              <a14:hiddenFill xmlns:a14="http://schemas.microsoft.com/office/drawing/2010/main" xmlns="">
+              <a14:hiddenFill xmlns="" xmlns:a14="http://schemas.microsoft.com/office/drawing/2010/main">
                 <a:solidFill>
                   <a:srgbClr val="FFFFFF"/>
                 </a:solidFill>
               </a14:hiddenFill>
             </a:ext>
             <a:ext uri="{91240B29-F687-4f45-9708-019B960494DF}">
-              <a14:hiddenLine xmlns:a14="http://schemas.microsoft.com/office/drawing/2010/main" xmlns="" w="9525">
+              <a14:hiddenLine xmlns="" xmlns:a14="http://schemas.microsoft.com/office/drawing/2010/main" w="9525">
                 <a:solidFill>
                   <a:srgbClr val="000000"/>
                 </a:solidFill>
@@ -15392,14 +15393,14 @@
           </a:ln>
           <a:extLst>
             <a:ext uri="{909E8E84-426E-40dd-AFC4-6F175D3DCCD1}">
-              <a14:hiddenFill xmlns:a14="http://schemas.microsoft.com/office/drawing/2010/main" xmlns="">
+              <a14:hiddenFill xmlns="" xmlns:a14="http://schemas.microsoft.com/office/drawing/2010/main">
                 <a:solidFill>
                   <a:srgbClr val="FFFFFF"/>
                 </a:solidFill>
               </a14:hiddenFill>
             </a:ext>
             <a:ext uri="{91240B29-F687-4f45-9708-019B960494DF}">
-              <a14:hiddenLine xmlns:a14="http://schemas.microsoft.com/office/drawing/2010/main" xmlns="" w="9525">
+              <a14:hiddenLine xmlns="" xmlns:a14="http://schemas.microsoft.com/office/drawing/2010/main" w="9525">
                 <a:solidFill>
                   <a:srgbClr val="000000"/>
                 </a:solidFill>
@@ -15696,14 +15697,14 @@
           </a:ln>
           <a:extLst>
             <a:ext uri="{909E8E84-426E-40dd-AFC4-6F175D3DCCD1}">
-              <a14:hiddenFill xmlns:a14="http://schemas.microsoft.com/office/drawing/2010/main" xmlns="">
+              <a14:hiddenFill xmlns="" xmlns:a14="http://schemas.microsoft.com/office/drawing/2010/main">
                 <a:solidFill>
                   <a:srgbClr val="FFFFFF"/>
                 </a:solidFill>
               </a14:hiddenFill>
             </a:ext>
             <a:ext uri="{91240B29-F687-4f45-9708-019B960494DF}">
-              <a14:hiddenLine xmlns:a14="http://schemas.microsoft.com/office/drawing/2010/main" xmlns="" w="9525">
+              <a14:hiddenLine xmlns="" xmlns:a14="http://schemas.microsoft.com/office/drawing/2010/main" w="9525">
                 <a:solidFill>
                   <a:srgbClr val="000000"/>
                 </a:solidFill>
@@ -15826,14 +15827,14 @@
           </a:ln>
           <a:extLst>
             <a:ext uri="{909E8E84-426E-40dd-AFC4-6F175D3DCCD1}">
-              <a14:hiddenFill xmlns:a14="http://schemas.microsoft.com/office/drawing/2010/main" xmlns="">
+              <a14:hiddenFill xmlns="" xmlns:a14="http://schemas.microsoft.com/office/drawing/2010/main">
                 <a:solidFill>
                   <a:srgbClr val="FFFFFF"/>
                 </a:solidFill>
               </a14:hiddenFill>
             </a:ext>
             <a:ext uri="{91240B29-F687-4f45-9708-019B960494DF}">
-              <a14:hiddenLine xmlns:a14="http://schemas.microsoft.com/office/drawing/2010/main" xmlns="" w="9525">
+              <a14:hiddenLine xmlns="" xmlns:a14="http://schemas.microsoft.com/office/drawing/2010/main" w="9525">
                 <a:solidFill>
                   <a:srgbClr val="000000"/>
                 </a:solidFill>
@@ -16064,14 +16065,14 @@
           <a:noFill/>
           <a:extLst>
             <a:ext uri="{909E8E84-426E-40dd-AFC4-6F175D3DCCD1}">
-              <a14:hiddenFill xmlns:a14="http://schemas.microsoft.com/office/drawing/2010/main" xmlns="">
+              <a14:hiddenFill xmlns="" xmlns:a14="http://schemas.microsoft.com/office/drawing/2010/main">
                 <a:solidFill>
                   <a:srgbClr val="FFFFFF"/>
                 </a:solidFill>
               </a14:hiddenFill>
             </a:ext>
             <a:ext uri="{91240B29-F687-4f45-9708-019B960494DF}">
-              <a14:hiddenLine xmlns:a14="http://schemas.microsoft.com/office/drawing/2010/main" xmlns="" w="9525">
+              <a14:hiddenLine xmlns="" xmlns:a14="http://schemas.microsoft.com/office/drawing/2010/main" w="9525">
                 <a:solidFill>
                   <a:srgbClr val="000000"/>
                 </a:solidFill>
@@ -18037,14 +18038,14 @@
           <a:noFill/>
           <a:extLst>
             <a:ext uri="{909E8E84-426E-40dd-AFC4-6F175D3DCCD1}">
-              <a14:hiddenFill xmlns:a14="http://schemas.microsoft.com/office/drawing/2010/main" xmlns="">
+              <a14:hiddenFill xmlns="" xmlns:a14="http://schemas.microsoft.com/office/drawing/2010/main">
                 <a:solidFill>
                   <a:srgbClr val="FFFFFF"/>
                 </a:solidFill>
               </a14:hiddenFill>
             </a:ext>
             <a:ext uri="{91240B29-F687-4f45-9708-019B960494DF}">
-              <a14:hiddenLine xmlns:a14="http://schemas.microsoft.com/office/drawing/2010/main" xmlns="" w="9525">
+              <a14:hiddenLine xmlns="" xmlns:a14="http://schemas.microsoft.com/office/drawing/2010/main" w="9525">
                 <a:solidFill>
                   <a:srgbClr val="000000"/>
                 </a:solidFill>
@@ -18425,14 +18426,14 @@
           </a:ln>
           <a:extLst>
             <a:ext uri="{909E8E84-426E-40dd-AFC4-6F175D3DCCD1}">
-              <a14:hiddenFill xmlns:a14="http://schemas.microsoft.com/office/drawing/2010/main" xmlns="">
+              <a14:hiddenFill xmlns="" xmlns:a14="http://schemas.microsoft.com/office/drawing/2010/main">
                 <a:solidFill>
                   <a:srgbClr val="FFFFFF"/>
                 </a:solidFill>
               </a14:hiddenFill>
             </a:ext>
             <a:ext uri="{91240B29-F687-4f45-9708-019B960494DF}">
-              <a14:hiddenLine xmlns:a14="http://schemas.microsoft.com/office/drawing/2010/main" xmlns="" w="9525">
+              <a14:hiddenLine xmlns="" xmlns:a14="http://schemas.microsoft.com/office/drawing/2010/main" w="9525">
                 <a:solidFill>
                   <a:srgbClr val="000000"/>
                 </a:solidFill>
@@ -18639,14 +18640,14 @@
           </a:ln>
           <a:extLst>
             <a:ext uri="{909E8E84-426E-40dd-AFC4-6F175D3DCCD1}">
-              <a14:hiddenFill xmlns:a14="http://schemas.microsoft.com/office/drawing/2010/main" xmlns="">
+              <a14:hiddenFill xmlns="" xmlns:a14="http://schemas.microsoft.com/office/drawing/2010/main">
                 <a:solidFill>
                   <a:srgbClr val="FFFFFF"/>
                 </a:solidFill>
               </a14:hiddenFill>
             </a:ext>
             <a:ext uri="{91240B29-F687-4f45-9708-019B960494DF}">
-              <a14:hiddenLine xmlns:a14="http://schemas.microsoft.com/office/drawing/2010/main" xmlns="" w="9525">
+              <a14:hiddenLine xmlns="" xmlns:a14="http://schemas.microsoft.com/office/drawing/2010/main" w="9525">
                 <a:solidFill>
                   <a:srgbClr val="000000"/>
                 </a:solidFill>
@@ -18865,14 +18866,14 @@
           </a:ln>
           <a:extLst>
             <a:ext uri="{909E8E84-426E-40dd-AFC4-6F175D3DCCD1}">
-              <a14:hiddenFill xmlns:a14="http://schemas.microsoft.com/office/drawing/2010/main" xmlns="">
+              <a14:hiddenFill xmlns="" xmlns:a14="http://schemas.microsoft.com/office/drawing/2010/main">
                 <a:solidFill>
                   <a:srgbClr val="FFFFFF"/>
                 </a:solidFill>
               </a14:hiddenFill>
             </a:ext>
             <a:ext uri="{91240B29-F687-4f45-9708-019B960494DF}">
-              <a14:hiddenLine xmlns:a14="http://schemas.microsoft.com/office/drawing/2010/main" xmlns="" w="9525">
+              <a14:hiddenLine xmlns="" xmlns:a14="http://schemas.microsoft.com/office/drawing/2010/main" w="9525">
                 <a:solidFill>
                   <a:srgbClr val="000000"/>
                 </a:solidFill>
@@ -19082,14 +19083,14 @@
           </a:ln>
           <a:extLst>
             <a:ext uri="{909E8E84-426E-40dd-AFC4-6F175D3DCCD1}">
-              <a14:hiddenFill xmlns:a14="http://schemas.microsoft.com/office/drawing/2010/main" xmlns="">
+              <a14:hiddenFill xmlns="" xmlns:a14="http://schemas.microsoft.com/office/drawing/2010/main">
                 <a:solidFill>
                   <a:srgbClr val="FFFFFF"/>
                 </a:solidFill>
               </a14:hiddenFill>
             </a:ext>
             <a:ext uri="{91240B29-F687-4f45-9708-019B960494DF}">
-              <a14:hiddenLine xmlns:a14="http://schemas.microsoft.com/office/drawing/2010/main" xmlns="" w="9525">
+              <a14:hiddenLine xmlns="" xmlns:a14="http://schemas.microsoft.com/office/drawing/2010/main" w="9525">
                 <a:solidFill>
                   <a:srgbClr val="000000"/>
                 </a:solidFill>
@@ -19340,14 +19341,14 @@
           </a:ln>
           <a:extLst>
             <a:ext uri="{909E8E84-426E-40dd-AFC4-6F175D3DCCD1}">
-              <a14:hiddenFill xmlns:a14="http://schemas.microsoft.com/office/drawing/2010/main" xmlns="">
+              <a14:hiddenFill xmlns="" xmlns:a14="http://schemas.microsoft.com/office/drawing/2010/main">
                 <a:solidFill>
                   <a:srgbClr val="FFFFFF"/>
                 </a:solidFill>
               </a14:hiddenFill>
             </a:ext>
             <a:ext uri="{91240B29-F687-4f45-9708-019B960494DF}">
-              <a14:hiddenLine xmlns:a14="http://schemas.microsoft.com/office/drawing/2010/main" xmlns="" w="9525">
+              <a14:hiddenLine xmlns="" xmlns:a14="http://schemas.microsoft.com/office/drawing/2010/main" w="9525">
                 <a:solidFill>
                   <a:srgbClr val="000000"/>
                 </a:solidFill>
@@ -19539,14 +19540,14 @@
           </a:ln>
           <a:extLst>
             <a:ext uri="{909E8E84-426E-40dd-AFC4-6F175D3DCCD1}">
-              <a14:hiddenFill xmlns:a14="http://schemas.microsoft.com/office/drawing/2010/main" xmlns="">
+              <a14:hiddenFill xmlns="" xmlns:a14="http://schemas.microsoft.com/office/drawing/2010/main">
                 <a:solidFill>
                   <a:srgbClr val="FFFFFF"/>
                 </a:solidFill>
               </a14:hiddenFill>
             </a:ext>
             <a:ext uri="{91240B29-F687-4f45-9708-019B960494DF}">
-              <a14:hiddenLine xmlns:a14="http://schemas.microsoft.com/office/drawing/2010/main" xmlns="" w="9525">
+              <a14:hiddenLine xmlns="" xmlns:a14="http://schemas.microsoft.com/office/drawing/2010/main" w="9525">
                 <a:solidFill>
                   <a:srgbClr val="000000"/>
                 </a:solidFill>
@@ -21576,6 +21577,1120 @@
       </p:grpSpPr>
       <p:sp>
         <p:nvSpPr>
+          <p:cNvPr id="5" name="Title 4">
+            <a:extLst>
+              <a:ext uri="{FF2B5EF4-FFF2-40B4-BE49-F238E27FC236}">
+                <a16:creationId xmlns:a16="http://schemas.microsoft.com/office/drawing/2014/main" id="{4B98497C-EAEA-9648-9D7B-2E8DF126FE86}"/>
+              </a:ext>
+            </a:extLst>
+          </p:cNvPr>
+          <p:cNvSpPr>
+            <a:spLocks noGrp="1"/>
+          </p:cNvSpPr>
+          <p:nvPr>
+            <p:ph type="title"/>
+          </p:nvPr>
+        </p:nvSpPr>
+        <p:spPr/>
+        <p:txBody>
+          <a:bodyPr/>
+          <a:lstStyle/>
+          <a:p>
+            <a:r>
+              <a:rPr lang="en-CN" dirty="0"/>
+              <a:t>Order Ranking Logic – under update</a:t>
+            </a:r>
+          </a:p>
+        </p:txBody>
+      </p:sp>
+      <p:sp>
+        <p:nvSpPr>
+          <p:cNvPr id="4" name="Process 3">
+            <a:extLst>
+              <a:ext uri="{FF2B5EF4-FFF2-40B4-BE49-F238E27FC236}">
+                <a16:creationId xmlns:a16="http://schemas.microsoft.com/office/drawing/2014/main" id="{3F05ACD7-DD48-6740-B25F-3B54D9E9C072}"/>
+              </a:ext>
+            </a:extLst>
+          </p:cNvPr>
+          <p:cNvSpPr/>
+          <p:nvPr/>
+        </p:nvSpPr>
+        <p:spPr>
+          <a:xfrm>
+            <a:off x="1539621" y="1681239"/>
+            <a:ext cx="1400505" cy="628355"/>
+          </a:xfrm>
+          <a:prstGeom prst="flowChartProcess">
+            <a:avLst/>
+          </a:prstGeom>
+          <a:noFill/>
+          <a:ln>
+            <a:solidFill>
+              <a:schemeClr val="tx1"/>
+            </a:solidFill>
+          </a:ln>
+          <a:effectLst/>
+        </p:spPr>
+        <p:style>
+          <a:lnRef idx="2">
+            <a:schemeClr val="accent1">
+              <a:shade val="50000"/>
+            </a:schemeClr>
+          </a:lnRef>
+          <a:fillRef idx="1">
+            <a:schemeClr val="accent1"/>
+          </a:fillRef>
+          <a:effectRef idx="0">
+            <a:schemeClr val="accent1"/>
+          </a:effectRef>
+          <a:fontRef idx="minor">
+            <a:schemeClr val="lt1"/>
+          </a:fontRef>
+        </p:style>
+        <p:txBody>
+          <a:bodyPr rtlCol="0" anchor="ctr"/>
+          <a:lstStyle/>
+          <a:p>
+            <a:pPr algn="ctr"/>
+            <a:r>
+              <a:rPr lang="en-CN" sz="1050" b="1" dirty="0">
+                <a:solidFill>
+                  <a:schemeClr val="tx1"/>
+                </a:solidFill>
+              </a:rPr>
+              <a:t>Top priority orders </a:t>
+            </a:r>
+          </a:p>
+          <a:p>
+            <a:pPr algn="ctr"/>
+            <a:r>
+              <a:rPr lang="en-CN" sz="1050" b="1" dirty="0">
+                <a:solidFill>
+                  <a:schemeClr val="tx1"/>
+                </a:solidFill>
+              </a:rPr>
+              <a:t>(PR1/2/3, Top100, L4, BUP)</a:t>
+            </a:r>
+          </a:p>
+        </p:txBody>
+      </p:sp>
+      <p:sp>
+        <p:nvSpPr>
+          <p:cNvPr id="6" name="Process 5">
+            <a:extLst>
+              <a:ext uri="{FF2B5EF4-FFF2-40B4-BE49-F238E27FC236}">
+                <a16:creationId xmlns:a16="http://schemas.microsoft.com/office/drawing/2014/main" id="{B2A9436C-26E6-FF49-87DA-5AB04F671D9D}"/>
+              </a:ext>
+            </a:extLst>
+          </p:cNvPr>
+          <p:cNvSpPr/>
+          <p:nvPr/>
+        </p:nvSpPr>
+        <p:spPr>
+          <a:xfrm>
+            <a:off x="7234923" y="1701438"/>
+            <a:ext cx="1400505" cy="614849"/>
+          </a:xfrm>
+          <a:prstGeom prst="flowChartProcess">
+            <a:avLst/>
+          </a:prstGeom>
+          <a:noFill/>
+          <a:ln>
+            <a:solidFill>
+              <a:schemeClr val="tx1"/>
+            </a:solidFill>
+          </a:ln>
+          <a:effectLst/>
+        </p:spPr>
+        <p:style>
+          <a:lnRef idx="2">
+            <a:schemeClr val="accent1">
+              <a:shade val="50000"/>
+            </a:schemeClr>
+          </a:lnRef>
+          <a:fillRef idx="1">
+            <a:schemeClr val="accent1"/>
+          </a:fillRef>
+          <a:effectRef idx="0">
+            <a:schemeClr val="accent1"/>
+          </a:effectRef>
+          <a:fontRef idx="minor">
+            <a:schemeClr val="lt1"/>
+          </a:fontRef>
+        </p:style>
+        <p:txBody>
+          <a:bodyPr rtlCol="0" anchor="ctr"/>
+          <a:lstStyle/>
+          <a:p>
+            <a:pPr algn="ctr"/>
+            <a:r>
+              <a:rPr lang="en-US" sz="1050" b="1" dirty="0">
+                <a:solidFill>
+                  <a:schemeClr val="tx1"/>
+                </a:solidFill>
+              </a:rPr>
+              <a:t>Order qty</a:t>
+            </a:r>
+            <a:endParaRPr lang="en-CN" sz="1050" dirty="0">
+              <a:solidFill>
+                <a:schemeClr val="tx1"/>
+              </a:solidFill>
+            </a:endParaRPr>
+          </a:p>
+        </p:txBody>
+      </p:sp>
+      <p:sp>
+        <p:nvSpPr>
+          <p:cNvPr id="8" name="TextBox 7">
+            <a:extLst>
+              <a:ext uri="{FF2B5EF4-FFF2-40B4-BE49-F238E27FC236}">
+                <a16:creationId xmlns:a16="http://schemas.microsoft.com/office/drawing/2014/main" id="{819C706F-00EC-E749-B9C0-51384C650EA0}"/>
+              </a:ext>
+            </a:extLst>
+          </p:cNvPr>
+          <p:cNvSpPr txBox="1"/>
+          <p:nvPr/>
+        </p:nvSpPr>
+        <p:spPr>
+          <a:xfrm>
+            <a:off x="1344716" y="4114073"/>
+            <a:ext cx="8164285" cy="738664"/>
+          </a:xfrm>
+          <a:prstGeom prst="rect">
+            <a:avLst/>
+          </a:prstGeom>
+          <a:noFill/>
+        </p:spPr>
+        <p:txBody>
+          <a:bodyPr wrap="square" rtlCol="0">
+            <a:spAutoFit/>
+          </a:bodyPr>
+          <a:lstStyle/>
+          <a:p>
+            <a:r>
+              <a:rPr lang="en-CN" sz="1400" b="1" dirty="0"/>
+              <a:t>Additional considerations:</a:t>
+            </a:r>
+          </a:p>
+          <a:p>
+            <a:pPr marL="285750" indent="-285750">
+              <a:buFont typeface="Arial" panose="020B0604020202020204" pitchFamily="34" charset="0"/>
+              <a:buChar char="•"/>
+            </a:pPr>
+            <a:r>
+              <a:rPr lang="en-US" sz="1400" dirty="0"/>
+              <a:t>D</a:t>
+            </a:r>
+            <a:r>
+              <a:rPr lang="en-CN" sz="1400" dirty="0"/>
+              <a:t>eprioritize MFG hold orders – put behind all other orders</a:t>
+            </a:r>
+          </a:p>
+          <a:p>
+            <a:pPr marL="285750" indent="-285750">
+              <a:buFont typeface="Arial" panose="020B0604020202020204" pitchFamily="34" charset="0"/>
+              <a:buChar char="•"/>
+            </a:pPr>
+            <a:r>
+              <a:rPr lang="en-CN" sz="1400" dirty="0"/>
+              <a:t>DPAS: some under PR7/8 instead of PR1/2/3, recategozied as PR1</a:t>
+            </a:r>
+            <a:endParaRPr lang="en-CN" sz="1400" b="1" dirty="0"/>
+          </a:p>
+        </p:txBody>
+      </p:sp>
+      <p:sp>
+        <p:nvSpPr>
+          <p:cNvPr id="9" name="TextBox 8">
+            <a:extLst>
+              <a:ext uri="{FF2B5EF4-FFF2-40B4-BE49-F238E27FC236}">
+                <a16:creationId xmlns:a16="http://schemas.microsoft.com/office/drawing/2014/main" id="{B14BA020-D561-B648-AE70-6E667593347E}"/>
+              </a:ext>
+            </a:extLst>
+          </p:cNvPr>
+          <p:cNvSpPr txBox="1"/>
+          <p:nvPr/>
+        </p:nvSpPr>
+        <p:spPr>
+          <a:xfrm>
+            <a:off x="3390945" y="2335987"/>
+            <a:ext cx="1554923" cy="461665"/>
+          </a:xfrm>
+          <a:prstGeom prst="rect">
+            <a:avLst/>
+          </a:prstGeom>
+          <a:noFill/>
+        </p:spPr>
+        <p:txBody>
+          <a:bodyPr wrap="square" rtlCol="0">
+            <a:spAutoFit/>
+          </a:bodyPr>
+          <a:lstStyle/>
+          <a:p>
+            <a:pPr algn="ctr"/>
+            <a:r>
+              <a:rPr lang="en-CN" sz="1200" dirty="0"/>
+              <a:t>Prioritize Aged and recommited</a:t>
+            </a:r>
+            <a:r>
+              <a:rPr lang="en-CN" sz="1200" dirty="0">
+                <a:solidFill>
+                  <a:srgbClr val="FF0000"/>
+                </a:solidFill>
+              </a:rPr>
+              <a:t> and YE</a:t>
+            </a:r>
+          </a:p>
+        </p:txBody>
+      </p:sp>
+      <p:sp>
+        <p:nvSpPr>
+          <p:cNvPr id="10" name="Process 9">
+            <a:extLst>
+              <a:ext uri="{FF2B5EF4-FFF2-40B4-BE49-F238E27FC236}">
+                <a16:creationId xmlns:a16="http://schemas.microsoft.com/office/drawing/2014/main" id="{93341E37-5679-154A-BDE3-805DBB290D37}"/>
+              </a:ext>
+            </a:extLst>
+          </p:cNvPr>
+          <p:cNvSpPr/>
+          <p:nvPr/>
+        </p:nvSpPr>
+        <p:spPr>
+          <a:xfrm>
+            <a:off x="3438055" y="1701438"/>
+            <a:ext cx="1400505" cy="593347"/>
+          </a:xfrm>
+          <a:prstGeom prst="flowChartProcess">
+            <a:avLst/>
+          </a:prstGeom>
+          <a:noFill/>
+          <a:ln>
+            <a:solidFill>
+              <a:schemeClr val="tx1"/>
+            </a:solidFill>
+          </a:ln>
+          <a:effectLst/>
+        </p:spPr>
+        <p:style>
+          <a:lnRef idx="2">
+            <a:schemeClr val="accent1">
+              <a:shade val="50000"/>
+            </a:schemeClr>
+          </a:lnRef>
+          <a:fillRef idx="1">
+            <a:schemeClr val="accent1"/>
+          </a:fillRef>
+          <a:effectRef idx="0">
+            <a:schemeClr val="accent1"/>
+          </a:effectRef>
+          <a:fontRef idx="minor">
+            <a:schemeClr val="lt1"/>
+          </a:fontRef>
+        </p:style>
+        <p:txBody>
+          <a:bodyPr rtlCol="0" anchor="ctr"/>
+          <a:lstStyle/>
+          <a:p>
+            <a:pPr algn="ctr"/>
+            <a:r>
+              <a:rPr lang="en-CN" sz="1050" b="1" dirty="0">
+                <a:solidFill>
+                  <a:schemeClr val="tx1"/>
+                </a:solidFill>
+              </a:rPr>
+              <a:t>OSSD</a:t>
+            </a:r>
+          </a:p>
+        </p:txBody>
+      </p:sp>
+      <p:sp>
+        <p:nvSpPr>
+          <p:cNvPr id="11" name="Process 10">
+            <a:extLst>
+              <a:ext uri="{FF2B5EF4-FFF2-40B4-BE49-F238E27FC236}">
+                <a16:creationId xmlns:a16="http://schemas.microsoft.com/office/drawing/2014/main" id="{37E74267-F278-E743-B7DF-DDC61A85D499}"/>
+              </a:ext>
+            </a:extLst>
+          </p:cNvPr>
+          <p:cNvSpPr/>
+          <p:nvPr/>
+        </p:nvSpPr>
+        <p:spPr>
+          <a:xfrm>
+            <a:off x="5336489" y="1701438"/>
+            <a:ext cx="1400506" cy="614849"/>
+          </a:xfrm>
+          <a:prstGeom prst="flowChartProcess">
+            <a:avLst/>
+          </a:prstGeom>
+          <a:noFill/>
+          <a:ln>
+            <a:solidFill>
+              <a:schemeClr val="tx1"/>
+            </a:solidFill>
+          </a:ln>
+          <a:effectLst/>
+        </p:spPr>
+        <p:style>
+          <a:lnRef idx="2">
+            <a:schemeClr val="accent1">
+              <a:shade val="50000"/>
+            </a:schemeClr>
+          </a:lnRef>
+          <a:fillRef idx="1">
+            <a:schemeClr val="accent1"/>
+          </a:fillRef>
+          <a:effectRef idx="0">
+            <a:schemeClr val="accent1"/>
+          </a:effectRef>
+          <a:fontRef idx="minor">
+            <a:schemeClr val="lt1"/>
+          </a:fontRef>
+        </p:style>
+        <p:txBody>
+          <a:bodyPr rtlCol="0" anchor="ctr"/>
+          <a:lstStyle/>
+          <a:p>
+            <a:pPr algn="ctr"/>
+            <a:r>
+              <a:rPr lang="en-CN" sz="1050" b="1" dirty="0">
+                <a:solidFill>
+                  <a:schemeClr val="tx1"/>
+                </a:solidFill>
+              </a:rPr>
+              <a:t>Current FCD</a:t>
+            </a:r>
+          </a:p>
+        </p:txBody>
+      </p:sp>
+      <p:sp>
+        <p:nvSpPr>
+          <p:cNvPr id="12" name="TextBox 11">
+            <a:extLst>
+              <a:ext uri="{FF2B5EF4-FFF2-40B4-BE49-F238E27FC236}">
+                <a16:creationId xmlns:a16="http://schemas.microsoft.com/office/drawing/2014/main" id="{BFDF90D0-B60C-D84D-80FB-5093CE8C2291}"/>
+              </a:ext>
+            </a:extLst>
+          </p:cNvPr>
+          <p:cNvSpPr txBox="1"/>
+          <p:nvPr/>
+        </p:nvSpPr>
+        <p:spPr>
+          <a:xfrm>
+            <a:off x="5233584" y="2335973"/>
+            <a:ext cx="1554923" cy="276999"/>
+          </a:xfrm>
+          <a:prstGeom prst="rect">
+            <a:avLst/>
+          </a:prstGeom>
+          <a:noFill/>
+        </p:spPr>
+        <p:txBody>
+          <a:bodyPr wrap="square" rtlCol="0">
+            <a:spAutoFit/>
+          </a:bodyPr>
+          <a:lstStyle/>
+          <a:p>
+            <a:pPr algn="ctr"/>
+            <a:r>
+              <a:rPr lang="en-CN" sz="1200" dirty="0"/>
+              <a:t>Prioritize earlier FCD</a:t>
+            </a:r>
+          </a:p>
+        </p:txBody>
+      </p:sp>
+      <p:sp>
+        <p:nvSpPr>
+          <p:cNvPr id="13" name="TextBox 12">
+            <a:extLst>
+              <a:ext uri="{FF2B5EF4-FFF2-40B4-BE49-F238E27FC236}">
+                <a16:creationId xmlns:a16="http://schemas.microsoft.com/office/drawing/2014/main" id="{5A778D64-412D-D44E-8ED4-9096215E7FCF}"/>
+              </a:ext>
+            </a:extLst>
+          </p:cNvPr>
+          <p:cNvSpPr txBox="1"/>
+          <p:nvPr/>
+        </p:nvSpPr>
+        <p:spPr>
+          <a:xfrm>
+            <a:off x="9050866" y="2368159"/>
+            <a:ext cx="1554923" cy="276999"/>
+          </a:xfrm>
+          <a:prstGeom prst="rect">
+            <a:avLst/>
+          </a:prstGeom>
+          <a:noFill/>
+        </p:spPr>
+        <p:txBody>
+          <a:bodyPr wrap="square" rtlCol="0">
+            <a:spAutoFit/>
+          </a:bodyPr>
+          <a:lstStyle/>
+          <a:p>
+            <a:pPr algn="ctr"/>
+            <a:r>
+              <a:rPr lang="en-CN" sz="1200" dirty="0"/>
+              <a:t>Prioritize rev order</a:t>
+            </a:r>
+          </a:p>
+        </p:txBody>
+      </p:sp>
+      <p:sp>
+        <p:nvSpPr>
+          <p:cNvPr id="14" name="TextBox 13">
+            <a:extLst>
+              <a:ext uri="{FF2B5EF4-FFF2-40B4-BE49-F238E27FC236}">
+                <a16:creationId xmlns:a16="http://schemas.microsoft.com/office/drawing/2014/main" id="{5A80F245-353C-8141-9177-DD3E68C46ACB}"/>
+              </a:ext>
+            </a:extLst>
+          </p:cNvPr>
+          <p:cNvSpPr txBox="1"/>
+          <p:nvPr/>
+        </p:nvSpPr>
+        <p:spPr>
+          <a:xfrm>
+            <a:off x="1539621" y="2362929"/>
+            <a:ext cx="1400505" cy="1384995"/>
+          </a:xfrm>
+          <a:prstGeom prst="rect">
+            <a:avLst/>
+          </a:prstGeom>
+          <a:noFill/>
+        </p:spPr>
+        <p:txBody>
+          <a:bodyPr wrap="square" rtlCol="0">
+            <a:spAutoFit/>
+          </a:bodyPr>
+          <a:lstStyle/>
+          <a:p>
+            <a:r>
+              <a:rPr lang="en-CN" sz="1200" dirty="0"/>
+              <a:t>Priority number:</a:t>
+            </a:r>
+          </a:p>
+          <a:p>
+            <a:pPr marL="171450" indent="-171450">
+              <a:buFont typeface="Arial" panose="020B0604020202020204" pitchFamily="34" charset="0"/>
+              <a:buChar char="•"/>
+            </a:pPr>
+            <a:r>
+              <a:rPr lang="en-CN" sz="1200" dirty="0"/>
+              <a:t>PR1: 1</a:t>
+            </a:r>
+          </a:p>
+          <a:p>
+            <a:pPr marL="171450" indent="-171450">
+              <a:buFont typeface="Arial" panose="020B0604020202020204" pitchFamily="34" charset="0"/>
+              <a:buChar char="•"/>
+            </a:pPr>
+            <a:r>
+              <a:rPr lang="en-CN" sz="1200" dirty="0"/>
+              <a:t>PR2: 2</a:t>
+            </a:r>
+          </a:p>
+          <a:p>
+            <a:pPr marL="171450" indent="-171450">
+              <a:buFont typeface="Arial" panose="020B0604020202020204" pitchFamily="34" charset="0"/>
+              <a:buChar char="•"/>
+            </a:pPr>
+            <a:r>
+              <a:rPr lang="en-CN" sz="1200" dirty="0"/>
+              <a:t>PR3: 3</a:t>
+            </a:r>
+          </a:p>
+          <a:p>
+            <a:pPr marL="171450" indent="-171450">
+              <a:buFont typeface="Arial" panose="020B0604020202020204" pitchFamily="34" charset="0"/>
+              <a:buChar char="•"/>
+            </a:pPr>
+            <a:r>
+              <a:rPr lang="en-CN" sz="1200" dirty="0"/>
+              <a:t>Top100: 4</a:t>
+            </a:r>
+          </a:p>
+          <a:p>
+            <a:pPr marL="171450" indent="-171450">
+              <a:buFont typeface="Arial" panose="020B0604020202020204" pitchFamily="34" charset="0"/>
+              <a:buChar char="•"/>
+            </a:pPr>
+            <a:r>
+              <a:rPr lang="en-CN" sz="1200" dirty="0"/>
+              <a:t>L4: 5</a:t>
+            </a:r>
+          </a:p>
+          <a:p>
+            <a:pPr marL="171450" indent="-171450">
+              <a:buFont typeface="Arial" panose="020B0604020202020204" pitchFamily="34" charset="0"/>
+              <a:buChar char="•"/>
+            </a:pPr>
+            <a:r>
+              <a:rPr lang="en-CN" sz="1200" dirty="0"/>
+              <a:t>BUP: 6</a:t>
+            </a:r>
+          </a:p>
+        </p:txBody>
+      </p:sp>
+      <p:cxnSp>
+        <p:nvCxnSpPr>
+          <p:cNvPr id="15" name="Straight Arrow Connector 14">
+            <a:extLst>
+              <a:ext uri="{FF2B5EF4-FFF2-40B4-BE49-F238E27FC236}">
+                <a16:creationId xmlns:a16="http://schemas.microsoft.com/office/drawing/2014/main" id="{A9927850-9911-F345-99CB-25887B94A6BD}"/>
+              </a:ext>
+            </a:extLst>
+          </p:cNvPr>
+          <p:cNvCxnSpPr>
+            <a:cxnSpLocks/>
+            <a:stCxn id="4" idx="3"/>
+            <a:endCxn id="10" idx="1"/>
+          </p:cNvCxnSpPr>
+          <p:nvPr/>
+        </p:nvCxnSpPr>
+        <p:spPr>
+          <a:xfrm>
+            <a:off x="2940126" y="1995417"/>
+            <a:ext cx="497929" cy="2695"/>
+          </a:xfrm>
+          <a:prstGeom prst="straightConnector1">
+            <a:avLst/>
+          </a:prstGeom>
+          <a:ln>
+            <a:tailEnd type="triangle"/>
+          </a:ln>
+        </p:spPr>
+        <p:style>
+          <a:lnRef idx="1">
+            <a:schemeClr val="accent1"/>
+          </a:lnRef>
+          <a:fillRef idx="0">
+            <a:schemeClr val="accent1"/>
+          </a:fillRef>
+          <a:effectRef idx="0">
+            <a:schemeClr val="accent1"/>
+          </a:effectRef>
+          <a:fontRef idx="minor">
+            <a:schemeClr val="tx1"/>
+          </a:fontRef>
+        </p:style>
+      </p:cxnSp>
+      <p:cxnSp>
+        <p:nvCxnSpPr>
+          <p:cNvPr id="16" name="Straight Arrow Connector 15">
+            <a:extLst>
+              <a:ext uri="{FF2B5EF4-FFF2-40B4-BE49-F238E27FC236}">
+                <a16:creationId xmlns:a16="http://schemas.microsoft.com/office/drawing/2014/main" id="{90BC6FC7-CA6D-8F47-AE7E-5F478D65C51C}"/>
+              </a:ext>
+            </a:extLst>
+          </p:cNvPr>
+          <p:cNvCxnSpPr>
+            <a:cxnSpLocks/>
+            <a:stCxn id="10" idx="3"/>
+            <a:endCxn id="11" idx="1"/>
+          </p:cNvCxnSpPr>
+          <p:nvPr/>
+        </p:nvCxnSpPr>
+        <p:spPr>
+          <a:xfrm>
+            <a:off x="4838560" y="1998112"/>
+            <a:ext cx="497929" cy="10751"/>
+          </a:xfrm>
+          <a:prstGeom prst="straightConnector1">
+            <a:avLst/>
+          </a:prstGeom>
+          <a:ln>
+            <a:tailEnd type="triangle"/>
+          </a:ln>
+        </p:spPr>
+        <p:style>
+          <a:lnRef idx="1">
+            <a:schemeClr val="accent1"/>
+          </a:lnRef>
+          <a:fillRef idx="0">
+            <a:schemeClr val="accent1"/>
+          </a:fillRef>
+          <a:effectRef idx="0">
+            <a:schemeClr val="accent1"/>
+          </a:effectRef>
+          <a:fontRef idx="minor">
+            <a:schemeClr val="tx1"/>
+          </a:fontRef>
+        </p:style>
+      </p:cxnSp>
+      <p:cxnSp>
+        <p:nvCxnSpPr>
+          <p:cNvPr id="17" name="Straight Arrow Connector 16">
+            <a:extLst>
+              <a:ext uri="{FF2B5EF4-FFF2-40B4-BE49-F238E27FC236}">
+                <a16:creationId xmlns:a16="http://schemas.microsoft.com/office/drawing/2014/main" id="{069DB8E9-C6FF-ED45-A5BC-2D5608131054}"/>
+              </a:ext>
+            </a:extLst>
+          </p:cNvPr>
+          <p:cNvCxnSpPr>
+            <a:cxnSpLocks/>
+            <a:stCxn id="11" idx="3"/>
+            <a:endCxn id="6" idx="1"/>
+          </p:cNvCxnSpPr>
+          <p:nvPr/>
+        </p:nvCxnSpPr>
+        <p:spPr>
+          <a:xfrm>
+            <a:off x="6736995" y="2008863"/>
+            <a:ext cx="497928" cy="0"/>
+          </a:xfrm>
+          <a:prstGeom prst="straightConnector1">
+            <a:avLst/>
+          </a:prstGeom>
+          <a:ln>
+            <a:tailEnd type="triangle"/>
+          </a:ln>
+        </p:spPr>
+        <p:style>
+          <a:lnRef idx="1">
+            <a:schemeClr val="accent1"/>
+          </a:lnRef>
+          <a:fillRef idx="0">
+            <a:schemeClr val="accent1"/>
+          </a:fillRef>
+          <a:effectRef idx="0">
+            <a:schemeClr val="accent1"/>
+          </a:effectRef>
+          <a:fontRef idx="minor">
+            <a:schemeClr val="tx1"/>
+          </a:fontRef>
+        </p:style>
+      </p:cxnSp>
+      <p:sp>
+        <p:nvSpPr>
+          <p:cNvPr id="18" name="Process 17">
+            <a:extLst>
+              <a:ext uri="{FF2B5EF4-FFF2-40B4-BE49-F238E27FC236}">
+                <a16:creationId xmlns:a16="http://schemas.microsoft.com/office/drawing/2014/main" id="{83B557F9-72D0-B74F-8B6C-CC70362ACA73}"/>
+              </a:ext>
+            </a:extLst>
+          </p:cNvPr>
+          <p:cNvSpPr/>
+          <p:nvPr/>
+        </p:nvSpPr>
+        <p:spPr>
+          <a:xfrm>
+            <a:off x="9128076" y="1701438"/>
+            <a:ext cx="1400505" cy="614849"/>
+          </a:xfrm>
+          <a:prstGeom prst="flowChartProcess">
+            <a:avLst/>
+          </a:prstGeom>
+          <a:noFill/>
+          <a:ln>
+            <a:solidFill>
+              <a:schemeClr val="tx1"/>
+            </a:solidFill>
+          </a:ln>
+          <a:effectLst/>
+        </p:spPr>
+        <p:style>
+          <a:lnRef idx="2">
+            <a:schemeClr val="accent1">
+              <a:shade val="50000"/>
+            </a:schemeClr>
+          </a:lnRef>
+          <a:fillRef idx="1">
+            <a:schemeClr val="accent1"/>
+          </a:fillRef>
+          <a:effectRef idx="0">
+            <a:schemeClr val="accent1"/>
+          </a:effectRef>
+          <a:fontRef idx="minor">
+            <a:schemeClr val="lt1"/>
+          </a:fontRef>
+        </p:style>
+        <p:txBody>
+          <a:bodyPr rtlCol="0" anchor="ctr"/>
+          <a:lstStyle/>
+          <a:p>
+            <a:pPr algn="ctr"/>
+            <a:r>
+              <a:rPr lang="en-US" sz="1050" b="1" dirty="0">
+                <a:solidFill>
+                  <a:schemeClr val="tx1"/>
+                </a:solidFill>
+              </a:rPr>
+              <a:t>Rev/non-rev</a:t>
+            </a:r>
+            <a:endParaRPr lang="en-CN" sz="1050" dirty="0">
+              <a:solidFill>
+                <a:schemeClr val="tx1"/>
+              </a:solidFill>
+            </a:endParaRPr>
+          </a:p>
+        </p:txBody>
+      </p:sp>
+      <p:sp>
+        <p:nvSpPr>
+          <p:cNvPr id="19" name="TextBox 18">
+            <a:extLst>
+              <a:ext uri="{FF2B5EF4-FFF2-40B4-BE49-F238E27FC236}">
+                <a16:creationId xmlns:a16="http://schemas.microsoft.com/office/drawing/2014/main" id="{2F737487-4D4B-E649-8643-28C2685770E8}"/>
+              </a:ext>
+            </a:extLst>
+          </p:cNvPr>
+          <p:cNvSpPr txBox="1"/>
+          <p:nvPr/>
+        </p:nvSpPr>
+        <p:spPr>
+          <a:xfrm>
+            <a:off x="7297850" y="2362929"/>
+            <a:ext cx="1405477" cy="461665"/>
+          </a:xfrm>
+          <a:prstGeom prst="rect">
+            <a:avLst/>
+          </a:prstGeom>
+          <a:noFill/>
+        </p:spPr>
+        <p:txBody>
+          <a:bodyPr wrap="square" rtlCol="0">
+            <a:spAutoFit/>
+          </a:bodyPr>
+          <a:lstStyle/>
+          <a:p>
+            <a:pPr algn="ctr"/>
+            <a:r>
+              <a:rPr lang="en-CN" sz="1200" dirty="0"/>
+              <a:t>Prioritize smaller qty order</a:t>
+            </a:r>
+          </a:p>
+        </p:txBody>
+      </p:sp>
+      <p:cxnSp>
+        <p:nvCxnSpPr>
+          <p:cNvPr id="20" name="Straight Arrow Connector 19">
+            <a:extLst>
+              <a:ext uri="{FF2B5EF4-FFF2-40B4-BE49-F238E27FC236}">
+                <a16:creationId xmlns:a16="http://schemas.microsoft.com/office/drawing/2014/main" id="{136E01A9-C166-744A-8AC4-D78B27B6A9B6}"/>
+              </a:ext>
+            </a:extLst>
+          </p:cNvPr>
+          <p:cNvCxnSpPr>
+            <a:cxnSpLocks/>
+            <a:endCxn id="18" idx="1"/>
+          </p:cNvCxnSpPr>
+          <p:nvPr/>
+        </p:nvCxnSpPr>
+        <p:spPr>
+          <a:xfrm>
+            <a:off x="8635428" y="2003487"/>
+            <a:ext cx="492648" cy="5376"/>
+          </a:xfrm>
+          <a:prstGeom prst="straightConnector1">
+            <a:avLst/>
+          </a:prstGeom>
+          <a:ln>
+            <a:tailEnd type="triangle"/>
+          </a:ln>
+        </p:spPr>
+        <p:style>
+          <a:lnRef idx="1">
+            <a:schemeClr val="accent1"/>
+          </a:lnRef>
+          <a:fillRef idx="0">
+            <a:schemeClr val="accent1"/>
+          </a:fillRef>
+          <a:effectRef idx="0">
+            <a:schemeClr val="accent1"/>
+          </a:effectRef>
+          <a:fontRef idx="minor">
+            <a:schemeClr val="tx1"/>
+          </a:fontRef>
+        </p:style>
+      </p:cxnSp>
+      <p:sp>
+        <p:nvSpPr>
+          <p:cNvPr id="2" name="TextBox 1">
+            <a:extLst>
+              <a:ext uri="{FF2B5EF4-FFF2-40B4-BE49-F238E27FC236}">
+                <a16:creationId xmlns:a16="http://schemas.microsoft.com/office/drawing/2014/main" id="{97B6BEF5-7520-8640-AE8B-22D6C75462C2}"/>
+              </a:ext>
+            </a:extLst>
+          </p:cNvPr>
+          <p:cNvSpPr txBox="1"/>
+          <p:nvPr/>
+        </p:nvSpPr>
+        <p:spPr>
+          <a:xfrm>
+            <a:off x="3445748" y="1399349"/>
+            <a:ext cx="3316614" cy="307777"/>
+          </a:xfrm>
+          <a:prstGeom prst="rect">
+            <a:avLst/>
+          </a:prstGeom>
+          <a:noFill/>
+        </p:spPr>
+        <p:txBody>
+          <a:bodyPr wrap="none" rtlCol="0">
+            <a:spAutoFit/>
+          </a:bodyPr>
+          <a:lstStyle/>
+          <a:p>
+            <a:r>
+              <a:rPr lang="en-CN" sz="1400" dirty="0"/>
+              <a:t>(date offset by PCBA to DF transit time)</a:t>
+            </a:r>
+          </a:p>
+        </p:txBody>
+      </p:sp>
+      <p:sp>
+        <p:nvSpPr>
+          <p:cNvPr id="3" name="TextBox 2">
+            <a:extLst>
+              <a:ext uri="{FF2B5EF4-FFF2-40B4-BE49-F238E27FC236}">
+                <a16:creationId xmlns:a16="http://schemas.microsoft.com/office/drawing/2014/main" id="{FCB1C6AC-07E7-834E-BDAC-006E77878B95}"/>
+              </a:ext>
+            </a:extLst>
+          </p:cNvPr>
+          <p:cNvSpPr txBox="1"/>
+          <p:nvPr/>
+        </p:nvSpPr>
+        <p:spPr>
+          <a:xfrm>
+            <a:off x="1344716" y="4983107"/>
+            <a:ext cx="9816662" cy="369332"/>
+          </a:xfrm>
+          <a:prstGeom prst="rect">
+            <a:avLst/>
+          </a:prstGeom>
+          <a:noFill/>
+        </p:spPr>
+        <p:txBody>
+          <a:bodyPr wrap="square" rtlCol="0">
+            <a:spAutoFit/>
+          </a:bodyPr>
+          <a:lstStyle/>
+          <a:p>
+            <a:r>
+              <a:rPr lang="en-CN" dirty="0">
+                <a:solidFill>
+                  <a:schemeClr val="accent6">
+                    <a:lumMod val="75000"/>
+                  </a:schemeClr>
+                </a:solidFill>
+              </a:rPr>
+              <a:t>Logic discussed and aligned with all DF managers; PPF team alignment in progress.</a:t>
+            </a:r>
+          </a:p>
+        </p:txBody>
+      </p:sp>
+      <p:sp>
+        <p:nvSpPr>
+          <p:cNvPr id="21" name="Process 20">
+            <a:extLst>
+              <a:ext uri="{FF2B5EF4-FFF2-40B4-BE49-F238E27FC236}">
+                <a16:creationId xmlns:a16="http://schemas.microsoft.com/office/drawing/2014/main" id="{5B904B13-F251-4942-A358-17F47640986B}"/>
+              </a:ext>
+            </a:extLst>
+          </p:cNvPr>
+          <p:cNvSpPr/>
+          <p:nvPr/>
+        </p:nvSpPr>
+        <p:spPr>
+          <a:xfrm>
+            <a:off x="3189090" y="2873680"/>
+            <a:ext cx="1554923" cy="593347"/>
+          </a:xfrm>
+          <a:prstGeom prst="flowChartProcess">
+            <a:avLst/>
+          </a:prstGeom>
+          <a:noFill/>
+          <a:ln>
+            <a:solidFill>
+              <a:srgbClr val="FFC080"/>
+            </a:solidFill>
+          </a:ln>
+          <a:effectLst/>
+        </p:spPr>
+        <p:style>
+          <a:lnRef idx="2">
+            <a:schemeClr val="accent1">
+              <a:shade val="50000"/>
+            </a:schemeClr>
+          </a:lnRef>
+          <a:fillRef idx="1">
+            <a:schemeClr val="accent1"/>
+          </a:fillRef>
+          <a:effectRef idx="0">
+            <a:schemeClr val="accent1"/>
+          </a:effectRef>
+          <a:fontRef idx="minor">
+            <a:schemeClr val="lt1"/>
+          </a:fontRef>
+        </p:style>
+        <p:txBody>
+          <a:bodyPr rtlCol="0" anchor="ctr"/>
+          <a:lstStyle/>
+          <a:p>
+            <a:pPr algn="ctr"/>
+            <a:r>
+              <a:rPr lang="en-CN" sz="1000" dirty="0">
+                <a:solidFill>
+                  <a:srgbClr val="FFC000"/>
+                </a:solidFill>
+              </a:rPr>
+              <a:t>Manual </a:t>
+            </a:r>
+            <a:r>
+              <a:rPr lang="en-CN" sz="1000" b="1" dirty="0">
+                <a:solidFill>
+                  <a:srgbClr val="FFC000"/>
+                </a:solidFill>
+              </a:rPr>
+              <a:t>exceptional</a:t>
+            </a:r>
+            <a:r>
+              <a:rPr lang="en-CN" sz="1000" dirty="0">
+                <a:solidFill>
+                  <a:srgbClr val="FFC000"/>
+                </a:solidFill>
+              </a:rPr>
+              <a:t> priority injection by PSP</a:t>
+            </a:r>
+          </a:p>
+        </p:txBody>
+      </p:sp>
+      <p:cxnSp>
+        <p:nvCxnSpPr>
+          <p:cNvPr id="22" name="Elbow Connector 21">
+            <a:extLst>
+              <a:ext uri="{FF2B5EF4-FFF2-40B4-BE49-F238E27FC236}">
+                <a16:creationId xmlns:a16="http://schemas.microsoft.com/office/drawing/2014/main" id="{F0F6E11C-96E1-B24E-AB12-562588E92669}"/>
+              </a:ext>
+            </a:extLst>
+          </p:cNvPr>
+          <p:cNvCxnSpPr>
+            <a:cxnSpLocks/>
+            <a:stCxn id="21" idx="1"/>
+          </p:cNvCxnSpPr>
+          <p:nvPr/>
+        </p:nvCxnSpPr>
+        <p:spPr>
+          <a:xfrm rot="10800000">
+            <a:off x="2806262" y="2325236"/>
+            <a:ext cx="382828" cy="845118"/>
+          </a:xfrm>
+          <a:prstGeom prst="bentConnector2">
+            <a:avLst/>
+          </a:prstGeom>
+          <a:ln>
+            <a:solidFill>
+              <a:srgbClr val="FFC080"/>
+            </a:solidFill>
+            <a:tailEnd type="triangle"/>
+          </a:ln>
+        </p:spPr>
+        <p:style>
+          <a:lnRef idx="1">
+            <a:schemeClr val="accent1"/>
+          </a:lnRef>
+          <a:fillRef idx="0">
+            <a:schemeClr val="accent1"/>
+          </a:fillRef>
+          <a:effectRef idx="0">
+            <a:schemeClr val="accent1"/>
+          </a:effectRef>
+          <a:fontRef idx="minor">
+            <a:schemeClr val="tx1"/>
+          </a:fontRef>
+        </p:style>
+      </p:cxnSp>
+      <p:sp>
+        <p:nvSpPr>
+          <p:cNvPr id="24" name="TextBox 23">
+            <a:extLst>
+              <a:ext uri="{FF2B5EF4-FFF2-40B4-BE49-F238E27FC236}">
+                <a16:creationId xmlns:a16="http://schemas.microsoft.com/office/drawing/2014/main" id="{F876017D-9B15-1A42-BDFB-3D7E0E9D2516}"/>
+              </a:ext>
+            </a:extLst>
+          </p:cNvPr>
+          <p:cNvSpPr txBox="1"/>
+          <p:nvPr/>
+        </p:nvSpPr>
+        <p:spPr>
+          <a:xfrm>
+            <a:off x="1361538" y="5676730"/>
+            <a:ext cx="10349467" cy="769441"/>
+          </a:xfrm>
+          <a:prstGeom prst="rect">
+            <a:avLst/>
+          </a:prstGeom>
+          <a:solidFill>
+            <a:schemeClr val="bg1"/>
+          </a:solidFill>
+        </p:spPr>
+        <p:txBody>
+          <a:bodyPr wrap="square" rtlCol="0">
+            <a:spAutoFit/>
+          </a:bodyPr>
+          <a:lstStyle/>
+          <a:p>
+            <a:r>
+              <a:rPr lang="en-CN" sz="1600" dirty="0"/>
+              <a:t>Note: </a:t>
+            </a:r>
+          </a:p>
+          <a:p>
+            <a:pPr marL="171450" indent="-171450">
+              <a:buFont typeface="Arial" panose="020B0604020202020204" pitchFamily="34" charset="0"/>
+              <a:buChar char="•"/>
+            </a:pPr>
+            <a:r>
+              <a:rPr lang="en-CN" sz="1400" dirty="0"/>
+              <a:t>Minor change on the logic to put order qty ahead of rev/non-rev compare with initial version reviewed with DF managers</a:t>
+            </a:r>
+          </a:p>
+          <a:p>
+            <a:pPr marL="171450" indent="-171450">
+              <a:buFont typeface="Arial" panose="020B0604020202020204" pitchFamily="34" charset="0"/>
+              <a:buChar char="•"/>
+            </a:pPr>
+            <a:r>
+              <a:rPr lang="en-CN" sz="1400" dirty="0"/>
+              <a:t>We will continue to review if different logic should be put in for different situation (e.g. qend, or even different BU if we should)</a:t>
+            </a:r>
+          </a:p>
+        </p:txBody>
+      </p:sp>
+    </p:spTree>
+    <p:extLst>
+      <p:ext uri="{BB962C8B-B14F-4D97-AF65-F5344CB8AC3E}">
+        <p14:creationId xmlns:p14="http://schemas.microsoft.com/office/powerpoint/2010/main" val="696312626"/>
+      </p:ext>
+    </p:extLst>
+  </p:cSld>
+  <p:clrMapOvr>
+    <a:masterClrMapping/>
+  </p:clrMapOvr>
+  <p:transition spd="med">
+    <p:fade/>
+  </p:transition>
+</p:sld>
+</file>
+
+<file path=ppt/slides/slide6.xml><?xml version="1.0" encoding="utf-8"?>
+<p:sld xmlns:a="http://schemas.openxmlformats.org/drawingml/2006/main" xmlns:r="http://schemas.openxmlformats.org/officeDocument/2006/relationships" xmlns:p="http://schemas.openxmlformats.org/presentationml/2006/main">
+  <p:cSld>
+    <p:spTree>
+      <p:nvGrpSpPr>
+        <p:cNvPr id="1" name=""/>
+        <p:cNvGrpSpPr/>
+        <p:nvPr/>
+      </p:nvGrpSpPr>
+      <p:grpSpPr>
+        <a:xfrm>
+          <a:off x="0" y="0"/>
+          <a:ext cx="0" cy="0"/>
+          <a:chOff x="0" y="0"/>
+          <a:chExt cx="0" cy="0"/>
+        </a:xfrm>
+      </p:grpSpPr>
+      <p:sp>
+        <p:nvSpPr>
           <p:cNvPr id="2" name="Title 1">
             <a:extLst>
               <a:ext uri="{FF2B5EF4-FFF2-40B4-BE49-F238E27FC236}">
@@ -23155,7 +24270,7 @@
 </p:sld>
 </file>
 
-<file path=ppt/slides/slide6.xml><?xml version="1.0" encoding="utf-8"?>
+<file path=ppt/slides/slide7.xml><?xml version="1.0" encoding="utf-8"?>
 <p:sld xmlns:a="http://schemas.openxmlformats.org/drawingml/2006/main" xmlns:r="http://schemas.openxmlformats.org/officeDocument/2006/relationships" xmlns:p="http://schemas.openxmlformats.org/presentationml/2006/main">
   <p:cSld>
     <p:spTree>
@@ -24317,7 +25432,7 @@
 </p:sld>
 </file>
 
-<file path=ppt/slides/slide7.xml><?xml version="1.0" encoding="utf-8"?>
+<file path=ppt/slides/slide8.xml><?xml version="1.0" encoding="utf-8"?>
 <p:sld xmlns:a="http://schemas.openxmlformats.org/drawingml/2006/main" xmlns:r="http://schemas.openxmlformats.org/officeDocument/2006/relationships" xmlns:p="http://schemas.openxmlformats.org/presentationml/2006/main">
   <p:cSld>
     <p:spTree>
@@ -24484,7 +25599,7 @@
 </p:sld>
 </file>
 
-<file path=ppt/slides/slide8.xml><?xml version="1.0" encoding="utf-8"?>
+<file path=ppt/slides/slide9.xml><?xml version="1.0" encoding="utf-8"?>
 <p:sld xmlns:a="http://schemas.openxmlformats.org/drawingml/2006/main" xmlns:r="http://schemas.openxmlformats.org/officeDocument/2006/relationships" xmlns:p="http://schemas.openxmlformats.org/presentationml/2006/main">
   <p:cSld>
     <p:spTree>

</xml_diff>